<commit_message>
Edited slides, from Bahasa Indonesia to English
</commit_message>
<xml_diff>
--- a/Python101_01_Awal.pptx
+++ b/Python101_01_Awal.pptx
@@ -1335,7 +1335,7 @@
             <a:fld id="{B61BEF0D-F0BB-DE4B-95CE-6DB70DBA9567}" type="datetimeFigureOut">
               <a:rPr lang="en-US" smtClean="0"/>
               <a:pPr/>
-              <a:t>4/3/2024</a:t>
+              <a:t>4/5/2024</a:t>
             </a:fld>
             <a:endParaRPr lang="en-US" dirty="0"/>
           </a:p>
@@ -1635,7 +1635,7 @@
             <a:fld id="{B61BEF0D-F0BB-DE4B-95CE-6DB70DBA9567}" type="datetimeFigureOut">
               <a:rPr lang="en-US" smtClean="0"/>
               <a:pPr/>
-              <a:t>4/3/2024</a:t>
+              <a:t>4/5/2024</a:t>
             </a:fld>
             <a:endParaRPr lang="en-US" dirty="0"/>
           </a:p>
@@ -1829,7 +1829,7 @@
             <a:fld id="{B61BEF0D-F0BB-DE4B-95CE-6DB70DBA9567}" type="datetimeFigureOut">
               <a:rPr lang="en-US" smtClean="0"/>
               <a:pPr/>
-              <a:t>4/3/2024</a:t>
+              <a:t>4/5/2024</a:t>
             </a:fld>
             <a:endParaRPr lang="en-US" dirty="0"/>
           </a:p>
@@ -2092,7 +2092,7 @@
             <a:fld id="{B61BEF0D-F0BB-DE4B-95CE-6DB70DBA9567}" type="datetimeFigureOut">
               <a:rPr lang="en-US" smtClean="0"/>
               <a:pPr/>
-              <a:t>4/3/2024</a:t>
+              <a:t>4/5/2024</a:t>
             </a:fld>
             <a:endParaRPr lang="en-US" dirty="0"/>
           </a:p>
@@ -2518,7 +2518,7 @@
             <a:fld id="{B61BEF0D-F0BB-DE4B-95CE-6DB70DBA9567}" type="datetimeFigureOut">
               <a:rPr lang="en-US" smtClean="0"/>
               <a:pPr/>
-              <a:t>4/3/2024</a:t>
+              <a:t>4/5/2024</a:t>
             </a:fld>
             <a:endParaRPr lang="en-US" dirty="0"/>
           </a:p>
@@ -3057,7 +3057,7 @@
             <a:fld id="{B61BEF0D-F0BB-DE4B-95CE-6DB70DBA9567}" type="datetimeFigureOut">
               <a:rPr lang="en-US" smtClean="0"/>
               <a:pPr/>
-              <a:t>4/3/2024</a:t>
+              <a:t>4/5/2024</a:t>
             </a:fld>
             <a:endParaRPr lang="en-US" dirty="0"/>
           </a:p>
@@ -3923,7 +3923,7 @@
             <a:fld id="{B61BEF0D-F0BB-DE4B-95CE-6DB70DBA9567}" type="datetimeFigureOut">
               <a:rPr lang="en-US" smtClean="0"/>
               <a:pPr/>
-              <a:t>4/3/2024</a:t>
+              <a:t>4/5/2024</a:t>
             </a:fld>
             <a:endParaRPr lang="en-US" dirty="0"/>
           </a:p>
@@ -4095,7 +4095,7 @@
             <a:fld id="{B61BEF0D-F0BB-DE4B-95CE-6DB70DBA9567}" type="datetimeFigureOut">
               <a:rPr lang="en-US" smtClean="0"/>
               <a:pPr/>
-              <a:t>4/3/2024</a:t>
+              <a:t>4/5/2024</a:t>
             </a:fld>
             <a:endParaRPr lang="en-US" dirty="0"/>
           </a:p>
@@ -4281,7 +4281,7 @@
             <a:fld id="{B61BEF0D-F0BB-DE4B-95CE-6DB70DBA9567}" type="datetimeFigureOut">
               <a:rPr lang="en-US" smtClean="0"/>
               <a:pPr/>
-              <a:t>4/3/2024</a:t>
+              <a:t>4/5/2024</a:t>
             </a:fld>
             <a:endParaRPr lang="en-US" dirty="0"/>
           </a:p>
@@ -4453,7 +4453,7 @@
             <a:fld id="{B61BEF0D-F0BB-DE4B-95CE-6DB70DBA9567}" type="datetimeFigureOut">
               <a:rPr lang="en-US" smtClean="0"/>
               <a:pPr/>
-              <a:t>4/3/2024</a:t>
+              <a:t>4/5/2024</a:t>
             </a:fld>
             <a:endParaRPr lang="en-US" dirty="0"/>
           </a:p>
@@ -4699,7 +4699,7 @@
             <a:fld id="{B61BEF0D-F0BB-DE4B-95CE-6DB70DBA9567}" type="datetimeFigureOut">
               <a:rPr lang="en-US" smtClean="0"/>
               <a:pPr/>
-              <a:t>4/3/2024</a:t>
+              <a:t>4/5/2024</a:t>
             </a:fld>
             <a:endParaRPr lang="en-US" dirty="0"/>
           </a:p>
@@ -4937,7 +4937,7 @@
             <a:fld id="{B61BEF0D-F0BB-DE4B-95CE-6DB70DBA9567}" type="datetimeFigureOut">
               <a:rPr lang="en-US" smtClean="0"/>
               <a:pPr/>
-              <a:t>4/3/2024</a:t>
+              <a:t>4/5/2024</a:t>
             </a:fld>
             <a:endParaRPr lang="en-US" dirty="0"/>
           </a:p>
@@ -5405,7 +5405,7 @@
             <a:fld id="{B61BEF0D-F0BB-DE4B-95CE-6DB70DBA9567}" type="datetimeFigureOut">
               <a:rPr lang="en-US" smtClean="0"/>
               <a:pPr/>
-              <a:t>4/3/2024</a:t>
+              <a:t>4/5/2024</a:t>
             </a:fld>
             <a:endParaRPr lang="en-US" dirty="0"/>
           </a:p>
@@ -5525,7 +5525,7 @@
             <a:fld id="{B61BEF0D-F0BB-DE4B-95CE-6DB70DBA9567}" type="datetimeFigureOut">
               <a:rPr lang="en-US" smtClean="0"/>
               <a:pPr/>
-              <a:t>4/3/2024</a:t>
+              <a:t>4/5/2024</a:t>
             </a:fld>
             <a:endParaRPr lang="en-US" dirty="0"/>
           </a:p>
@@ -5622,7 +5622,7 @@
             <a:fld id="{B61BEF0D-F0BB-DE4B-95CE-6DB70DBA9567}" type="datetimeFigureOut">
               <a:rPr lang="en-US" smtClean="0"/>
               <a:pPr/>
-              <a:t>4/3/2024</a:t>
+              <a:t>4/5/2024</a:t>
             </a:fld>
             <a:endParaRPr lang="en-US" dirty="0"/>
           </a:p>
@@ -5879,7 +5879,7 @@
             <a:fld id="{B61BEF0D-F0BB-DE4B-95CE-6DB70DBA9567}" type="datetimeFigureOut">
               <a:rPr lang="en-US" smtClean="0"/>
               <a:pPr/>
-              <a:t>4/3/2024</a:t>
+              <a:t>4/5/2024</a:t>
             </a:fld>
             <a:endParaRPr lang="en-US" dirty="0"/>
           </a:p>
@@ -6181,7 +6181,7 @@
             <a:fld id="{B61BEF0D-F0BB-DE4B-95CE-6DB70DBA9567}" type="datetimeFigureOut">
               <a:rPr lang="en-US" smtClean="0"/>
               <a:pPr/>
-              <a:t>4/3/2024</a:t>
+              <a:t>4/5/2024</a:t>
             </a:fld>
             <a:endParaRPr lang="en-US" dirty="0"/>
           </a:p>
@@ -6417,7 +6417,7 @@
             <a:fld id="{B61BEF0D-F0BB-DE4B-95CE-6DB70DBA9567}" type="datetimeFigureOut">
               <a:rPr lang="en-US" smtClean="0"/>
               <a:pPr/>
-              <a:t>4/3/2024</a:t>
+              <a:t>4/5/2024</a:t>
             </a:fld>
             <a:endParaRPr lang="en-US" dirty="0"/>
           </a:p>
@@ -7277,10 +7277,10 @@
                   </a:outerShdw>
                 </a:effectLst>
               </a:rPr>
-              <a:t>Teks </a:t>
-            </a:r>
-            <a:r>
-              <a:rPr lang="en-US" sz="4000" dirty="0" err="1">
+              <a:t>More</a:t>
+            </a:r>
+            <a:br>
+              <a:rPr lang="en-US" sz="4000" dirty="0">
                 <a:effectLst>
                   <a:glow rad="38100">
                     <a:schemeClr val="bg1">
@@ -7296,24 +7296,26 @@
                   </a:outerShdw>
                 </a:effectLst>
               </a:rPr>
-              <a:t>Lagi</a:t>
-            </a:r>
-            <a:endParaRPr lang="en-US" sz="4000" dirty="0">
-              <a:effectLst>
-                <a:glow rad="38100">
-                  <a:schemeClr val="bg1">
-                    <a:lumMod val="65000"/>
-                    <a:lumOff val="35000"/>
-                    <a:alpha val="50000"/>
-                  </a:schemeClr>
-                </a:glow>
-                <a:outerShdw blurRad="28575" dist="31750" dir="13200000" algn="tl" rotWithShape="0">
-                  <a:srgbClr val="000000">
-                    <a:alpha val="25000"/>
-                  </a:srgbClr>
-                </a:outerShdw>
-              </a:effectLst>
-            </a:endParaRPr>
+            </a:br>
+            <a:r>
+              <a:rPr lang="en-US" sz="4000" dirty="0">
+                <a:effectLst>
+                  <a:glow rad="38100">
+                    <a:schemeClr val="bg1">
+                      <a:lumMod val="65000"/>
+                      <a:lumOff val="35000"/>
+                      <a:alpha val="50000"/>
+                    </a:schemeClr>
+                  </a:glow>
+                  <a:outerShdw blurRad="28575" dist="31750" dir="13200000" algn="tl" rotWithShape="0">
+                    <a:srgbClr val="000000">
+                      <a:alpha val="25000"/>
+                    </a:srgbClr>
+                  </a:outerShdw>
+                </a:effectLst>
+              </a:rPr>
+              <a:t>Texts</a:t>
+            </a:r>
           </a:p>
         </p:txBody>
       </p:sp>
@@ -8301,7 +8303,44 @@
                   </a:outerShdw>
                 </a:effectLst>
               </a:rPr>
-              <a:t>Teks</a:t>
+              <a:t>Text </a:t>
+            </a:r>
+            <a:br>
+              <a:rPr lang="en-US" sz="4000" dirty="0">
+                <a:effectLst>
+                  <a:glow rad="38100">
+                    <a:schemeClr val="bg1">
+                      <a:lumMod val="65000"/>
+                      <a:lumOff val="35000"/>
+                      <a:alpha val="50000"/>
+                    </a:schemeClr>
+                  </a:glow>
+                  <a:outerShdw blurRad="28575" dist="31750" dir="13200000" algn="tl" rotWithShape="0">
+                    <a:srgbClr val="000000">
+                      <a:alpha val="25000"/>
+                    </a:srgbClr>
+                  </a:outerShdw>
+                </a:effectLst>
+              </a:rPr>
+            </a:br>
+            <a:r>
+              <a:rPr lang="en-US" sz="4000" dirty="0">
+                <a:effectLst>
+                  <a:glow rad="38100">
+                    <a:schemeClr val="bg1">
+                      <a:lumMod val="65000"/>
+                      <a:lumOff val="35000"/>
+                      <a:alpha val="50000"/>
+                    </a:schemeClr>
+                  </a:glow>
+                  <a:outerShdw blurRad="28575" dist="31750" dir="13200000" algn="tl" rotWithShape="0">
+                    <a:srgbClr val="000000">
+                      <a:alpha val="25000"/>
+                    </a:srgbClr>
+                  </a:outerShdw>
+                </a:effectLst>
+              </a:rPr>
+              <a:t>(Strings)</a:t>
             </a:r>
           </a:p>
         </p:txBody>
@@ -8330,8 +8369,8 @@
         </p:blipFill>
         <p:spPr>
           <a:xfrm>
-            <a:off x="1107433" y="1731963"/>
-            <a:ext cx="7710183" cy="4059237"/>
+            <a:off x="658761" y="1492266"/>
+            <a:ext cx="8092397" cy="4260464"/>
           </a:xfrm>
         </p:spPr>
       </p:pic>

</xml_diff>